<commit_message>
Respect template aspect ratio when building presentations
Update PowerPointBuilderAgent to preserve custom template dimensions instead of forcing 16:9 aspect ratio, ensuring template design integrity. Only set 16:9 for default presentations. Add template dimension logging for debugging. Update default template and minor config/comment improvements.
</commit_message>
<xml_diff>
--- a/azure_function_ppt/templates/default_template.pptx
+++ b/azure_function_ppt/templates/default_template.pptx
@@ -817,6 +817,78 @@
           </a:fontRef>
         </p:style>
       </p:cxnSp>
+      <p:sp>
+        <p:nvSpPr>
+          <p:cNvPr id="8" name="Title 7">
+            <a:extLst>
+              <a:ext uri="{FF2B5EF4-FFF2-40B4-BE49-F238E27FC236}">
+                <a16:creationId xmlns:a16="http://schemas.microsoft.com/office/drawing/2014/main" id="{3B12D270-1C70-4905-EC3A-94F6F0FF4B36}"/>
+              </a:ext>
+            </a:extLst>
+          </p:cNvPr>
+          <p:cNvSpPr>
+            <a:spLocks noGrp="1"/>
+          </p:cNvSpPr>
+          <p:nvPr>
+            <p:ph type="title"/>
+          </p:nvPr>
+        </p:nvSpPr>
+        <p:spPr>
+          <a:xfrm>
+            <a:off x="838200" y="1588853"/>
+            <a:ext cx="10515600" cy="1325563"/>
+          </a:xfrm>
+          <a:prstGeom prst="rect">
+            <a:avLst/>
+          </a:prstGeom>
+        </p:spPr>
+        <p:txBody>
+          <a:bodyPr/>
+          <a:lstStyle/>
+          <a:p>
+            <a:endParaRPr lang="en-US" dirty="0"/>
+          </a:p>
+        </p:txBody>
+      </p:sp>
+      <p:sp>
+        <p:nvSpPr>
+          <p:cNvPr id="10" name="Text Placeholder 9">
+            <a:extLst>
+              <a:ext uri="{FF2B5EF4-FFF2-40B4-BE49-F238E27FC236}">
+                <a16:creationId xmlns:a16="http://schemas.microsoft.com/office/drawing/2014/main" id="{17BC63FD-C70E-50B6-CE7D-3013EDF7CAE3}"/>
+              </a:ext>
+            </a:extLst>
+          </p:cNvPr>
+          <p:cNvSpPr>
+            <a:spLocks noGrp="1"/>
+          </p:cNvSpPr>
+          <p:nvPr>
+            <p:ph type="body" sz="quarter" idx="10"/>
+          </p:nvPr>
+        </p:nvSpPr>
+        <p:spPr>
+          <a:xfrm>
+            <a:off x="1641475" y="4572000"/>
+            <a:ext cx="4718050" cy="1101725"/>
+          </a:xfrm>
+          <a:prstGeom prst="rect">
+            <a:avLst/>
+          </a:prstGeom>
+        </p:spPr>
+        <p:txBody>
+          <a:bodyPr/>
+          <a:lstStyle>
+            <a:lvl1pPr marL="0" indent="0">
+              <a:buNone/>
+              <a:defRPr/>
+            </a:lvl1pPr>
+          </a:lstStyle>
+          <a:p>
+            <a:pPr lvl="0"/>
+            <a:endParaRPr lang="en-US" dirty="0"/>
+          </a:p>
+        </p:txBody>
+      </p:sp>
     </p:spTree>
     <p:extLst>
       <p:ext uri="{BB962C8B-B14F-4D97-AF65-F5344CB8AC3E}">
@@ -1039,6 +1111,77 @@
           </a:prstGeom>
         </p:spPr>
       </p:pic>
+      <p:sp>
+        <p:nvSpPr>
+          <p:cNvPr id="5" name="Title 4">
+            <a:extLst>
+              <a:ext uri="{FF2B5EF4-FFF2-40B4-BE49-F238E27FC236}">
+                <a16:creationId xmlns:a16="http://schemas.microsoft.com/office/drawing/2014/main" id="{662A9060-2423-A5CD-D071-EDB8C21A2DDD}"/>
+              </a:ext>
+            </a:extLst>
+          </p:cNvPr>
+          <p:cNvSpPr>
+            <a:spLocks noGrp="1"/>
+          </p:cNvSpPr>
+          <p:nvPr>
+            <p:ph type="title"/>
+          </p:nvPr>
+        </p:nvSpPr>
+        <p:spPr>
+          <a:xfrm>
+            <a:off x="838200" y="479959"/>
+            <a:ext cx="10515600" cy="1016866"/>
+          </a:xfrm>
+          <a:prstGeom prst="rect">
+            <a:avLst/>
+          </a:prstGeom>
+        </p:spPr>
+        <p:txBody>
+          <a:bodyPr/>
+          <a:lstStyle>
+            <a:lvl1pPr algn="ctr">
+              <a:defRPr/>
+            </a:lvl1pPr>
+          </a:lstStyle>
+          <a:p>
+            <a:endParaRPr lang="en-US" dirty="0"/>
+          </a:p>
+        </p:txBody>
+      </p:sp>
+      <p:sp>
+        <p:nvSpPr>
+          <p:cNvPr id="10" name="Content Placeholder 9">
+            <a:extLst>
+              <a:ext uri="{FF2B5EF4-FFF2-40B4-BE49-F238E27FC236}">
+                <a16:creationId xmlns:a16="http://schemas.microsoft.com/office/drawing/2014/main" id="{9587B15D-8709-3181-6C38-5960F57A5D75}"/>
+              </a:ext>
+            </a:extLst>
+          </p:cNvPr>
+          <p:cNvSpPr>
+            <a:spLocks noGrp="1"/>
+          </p:cNvSpPr>
+          <p:nvPr>
+            <p:ph sz="quarter" idx="10"/>
+          </p:nvPr>
+        </p:nvSpPr>
+        <p:spPr>
+          <a:xfrm>
+            <a:off x="838200" y="2317750"/>
+            <a:ext cx="10515600" cy="3790950"/>
+          </a:xfrm>
+          <a:prstGeom prst="rect">
+            <a:avLst/>
+          </a:prstGeom>
+        </p:spPr>
+        <p:txBody>
+          <a:bodyPr/>
+          <a:lstStyle/>
+          <a:p>
+            <a:pPr lvl="0"/>
+            <a:endParaRPr lang="en-US" dirty="0"/>
+          </a:p>
+        </p:txBody>
+      </p:sp>
     </p:spTree>
     <p:extLst>
       <p:ext uri="{BB962C8B-B14F-4D97-AF65-F5344CB8AC3E}">
@@ -1233,6 +1376,40 @@
           </a:p>
         </p:txBody>
       </p:sp>
+      <p:sp>
+        <p:nvSpPr>
+          <p:cNvPr id="7" name="Text Placeholder 6">
+            <a:extLst>
+              <a:ext uri="{FF2B5EF4-FFF2-40B4-BE49-F238E27FC236}">
+                <a16:creationId xmlns:a16="http://schemas.microsoft.com/office/drawing/2014/main" id="{039968F6-20B0-0E90-7A8C-547C5D4A1756}"/>
+              </a:ext>
+            </a:extLst>
+          </p:cNvPr>
+          <p:cNvSpPr>
+            <a:spLocks noGrp="1"/>
+          </p:cNvSpPr>
+          <p:nvPr>
+            <p:ph type="body" sz="quarter" idx="10"/>
+          </p:nvPr>
+        </p:nvSpPr>
+        <p:spPr>
+          <a:xfrm>
+            <a:off x="1360488" y="4332288"/>
+            <a:ext cx="10037762" cy="1933575"/>
+          </a:xfrm>
+          <a:prstGeom prst="rect">
+            <a:avLst/>
+          </a:prstGeom>
+        </p:spPr>
+        <p:txBody>
+          <a:bodyPr/>
+          <a:lstStyle/>
+          <a:p>
+            <a:pPr lvl="0"/>
+            <a:endParaRPr lang="en-US" dirty="0"/>
+          </a:p>
+        </p:txBody>
+      </p:sp>
     </p:spTree>
     <p:extLst>
       <p:ext uri="{BB962C8B-B14F-4D97-AF65-F5344CB8AC3E}">
@@ -3786,40 +3963,6 @@
 </file>
 
 <file path=customXml/item1.xml><?xml version="1.0" encoding="utf-8"?>
-<?mso-contentType ?>
-<FormTemplates xmlns="http://schemas.microsoft.com/sharepoint/v3/contenttype/forms">
-  <Display>DocumentLibraryForm</Display>
-  <Edit>DocumentLibraryForm</Edit>
-  <New>DocumentLibraryForm</New>
-</FormTemplates>
-</file>
-
-<file path=customXml/item2.xml><?xml version="1.0" encoding="utf-8"?>
-<p:properties xmlns:p="http://schemas.microsoft.com/office/2006/metadata/properties" xmlns:xsi="http://www.w3.org/2001/XMLSchema-instance" xmlns:pc="http://schemas.microsoft.com/office/infopath/2007/PartnerControls">
-  <documentManagement>
-    <lcf76f155ced4ddcb4097134ff3c332f xmlns="0ec08cb2-ab7c-4bf2-9784-f016f47cdc51">
-      <Terms xmlns="http://schemas.microsoft.com/office/infopath/2007/PartnerControls"/>
-    </lcf76f155ced4ddcb4097134ff3c332f>
-    <TaxCatchAll xmlns="ee2ed37b-27b4-4fa3-9907-ba0fea429c51" xsi:nil="true"/>
-    <MediaLengthInSeconds xmlns="0ec08cb2-ab7c-4bf2-9784-f016f47cdc51" xsi:nil="true"/>
-    <SharedWithUsers xmlns="ee2ed37b-27b4-4fa3-9907-ba0fea429c51">
-      <UserInfo>
-        <DisplayName>Jolene Yuen</DisplayName>
-        <AccountId>1818</AccountId>
-        <AccountType/>
-      </UserInfo>
-      <UserInfo>
-        <DisplayName>Justin Yang</DisplayName>
-        <AccountId>614</AccountId>
-        <AccountType/>
-      </UserInfo>
-    </SharedWithUsers>
-    <Size xmlns="0ec08cb2-ab7c-4bf2-9784-f016f47cdc51" xsi:nil="true"/>
-  </documentManagement>
-</p:properties>
-</file>
-
-<file path=customXml/item3.xml><?xml version="1.0" encoding="utf-8"?>
 <ct:contentTypeSchema xmlns:ct="http://schemas.microsoft.com/office/2006/metadata/contentType" xmlns:ma="http://schemas.microsoft.com/office/2006/metadata/properties/metaAttributes" ct:_="" ma:_="" ma:contentTypeName="Document" ma:contentTypeID="0x010100821BDD180B19D54AABA6F39C85520B0B" ma:contentTypeVersion="19" ma:contentTypeDescription="Create a new document." ma:contentTypeScope="" ma:versionID="3d454b81c06d06f601d60765114228f4">
   <xsd:schema xmlns:xsd="http://www.w3.org/2001/XMLSchema" xmlns:xs="http://www.w3.org/2001/XMLSchema" xmlns:p="http://schemas.microsoft.com/office/2006/metadata/properties" xmlns:ns2="0ec08cb2-ab7c-4bf2-9784-f016f47cdc51" xmlns:ns3="ee2ed37b-27b4-4fa3-9907-ba0fea429c51" targetNamespace="http://schemas.microsoft.com/office/2006/metadata/properties" ma:root="true" ma:fieldsID="4d2aa965a6db8138067f326d44baddb5" ns2:_="" ns3:_="">
     <xsd:import namespace="0ec08cb2-ab7c-4bf2-9784-f016f47cdc51"/>
@@ -4082,10 +4225,55 @@
 </ct:contentTypeSchema>
 </file>
 
+<file path=customXml/item2.xml><?xml version="1.0" encoding="utf-8"?>
+<p:properties xmlns:p="http://schemas.microsoft.com/office/2006/metadata/properties" xmlns:xsi="http://www.w3.org/2001/XMLSchema-instance" xmlns:pc="http://schemas.microsoft.com/office/infopath/2007/PartnerControls">
+  <documentManagement>
+    <lcf76f155ced4ddcb4097134ff3c332f xmlns="0ec08cb2-ab7c-4bf2-9784-f016f47cdc51">
+      <Terms xmlns="http://schemas.microsoft.com/office/infopath/2007/PartnerControls"/>
+    </lcf76f155ced4ddcb4097134ff3c332f>
+    <TaxCatchAll xmlns="ee2ed37b-27b4-4fa3-9907-ba0fea429c51" xsi:nil="true"/>
+    <MediaLengthInSeconds xmlns="0ec08cb2-ab7c-4bf2-9784-f016f47cdc51" xsi:nil="true"/>
+    <SharedWithUsers xmlns="ee2ed37b-27b4-4fa3-9907-ba0fea429c51">
+      <UserInfo>
+        <DisplayName>Jolene Yuen</DisplayName>
+        <AccountId>1818</AccountId>
+        <AccountType/>
+      </UserInfo>
+      <UserInfo>
+        <DisplayName>Justin Yang</DisplayName>
+        <AccountId>614</AccountId>
+        <AccountType/>
+      </UserInfo>
+    </SharedWithUsers>
+    <Size xmlns="0ec08cb2-ab7c-4bf2-9784-f016f47cdc51" xsi:nil="true"/>
+  </documentManagement>
+</p:properties>
+</file>
+
+<file path=customXml/item3.xml><?xml version="1.0" encoding="utf-8"?>
+<?mso-contentType ?>
+<FormTemplates xmlns="http://schemas.microsoft.com/sharepoint/v3/contenttype/forms">
+  <Display>DocumentLibraryForm</Display>
+  <Edit>DocumentLibraryForm</Edit>
+  <New>DocumentLibraryForm</New>
+</FormTemplates>
+</file>
+
 <file path=customXml/itemProps1.xml><?xml version="1.0" encoding="utf-8"?>
-<ds:datastoreItem xmlns:ds="http://schemas.openxmlformats.org/officeDocument/2006/customXml" ds:itemID="{6BCBB70C-2BCC-4239-ACE0-CFA6AFFAA6BD}">
+<ds:datastoreItem xmlns:ds="http://schemas.openxmlformats.org/officeDocument/2006/customXml" ds:itemID="{788D43CF-8E0F-4E47-8063-C88E80389108}">
   <ds:schemaRefs>
-    <ds:schemaRef ds:uri="http://schemas.microsoft.com/sharepoint/v3/contenttype/forms"/>
+    <ds:schemaRef ds:uri="http://schemas.microsoft.com/office/2006/metadata/contentType"/>
+    <ds:schemaRef ds:uri="http://schemas.microsoft.com/office/2006/metadata/properties/metaAttributes"/>
+    <ds:schemaRef ds:uri="http://www.w3.org/2001/XMLSchema"/>
+    <ds:schemaRef ds:uri="http://schemas.microsoft.com/office/2006/metadata/properties"/>
+    <ds:schemaRef ds:uri="0ec08cb2-ab7c-4bf2-9784-f016f47cdc51"/>
+    <ds:schemaRef ds:uri="ee2ed37b-27b4-4fa3-9907-ba0fea429c51"/>
+    <ds:schemaRef ds:uri="http://schemas.microsoft.com/office/2006/documentManagement/types"/>
+    <ds:schemaRef ds:uri="http://schemas.microsoft.com/office/infopath/2007/PartnerControls"/>
+    <ds:schemaRef ds:uri="http://schemas.openxmlformats.org/package/2006/metadata/core-properties"/>
+    <ds:schemaRef ds:uri="http://purl.org/dc/elements/1.1/"/>
+    <ds:schemaRef ds:uri="http://purl.org/dc/terms/"/>
+    <ds:schemaRef ds:uri="http://schemas.microsoft.com/internal/obd"/>
   </ds:schemaRefs>
 </ds:datastoreItem>
 </file>
@@ -4111,20 +4299,9 @@
 </file>
 
 <file path=customXml/itemProps3.xml><?xml version="1.0" encoding="utf-8"?>
-<ds:datastoreItem xmlns:ds="http://schemas.openxmlformats.org/officeDocument/2006/customXml" ds:itemID="{788D43CF-8E0F-4E47-8063-C88E80389108}">
+<ds:datastoreItem xmlns:ds="http://schemas.openxmlformats.org/officeDocument/2006/customXml" ds:itemID="{6BCBB70C-2BCC-4239-ACE0-CFA6AFFAA6BD}">
   <ds:schemaRefs>
-    <ds:schemaRef ds:uri="http://schemas.microsoft.com/office/2006/metadata/contentType"/>
-    <ds:schemaRef ds:uri="http://schemas.microsoft.com/office/2006/metadata/properties/metaAttributes"/>
-    <ds:schemaRef ds:uri="http://www.w3.org/2001/XMLSchema"/>
-    <ds:schemaRef ds:uri="http://schemas.microsoft.com/office/2006/metadata/properties"/>
-    <ds:schemaRef ds:uri="0ec08cb2-ab7c-4bf2-9784-f016f47cdc51"/>
-    <ds:schemaRef ds:uri="ee2ed37b-27b4-4fa3-9907-ba0fea429c51"/>
-    <ds:schemaRef ds:uri="http://schemas.microsoft.com/office/2006/documentManagement/types"/>
-    <ds:schemaRef ds:uri="http://schemas.microsoft.com/office/infopath/2007/PartnerControls"/>
-    <ds:schemaRef ds:uri="http://schemas.openxmlformats.org/package/2006/metadata/core-properties"/>
-    <ds:schemaRef ds:uri="http://purl.org/dc/elements/1.1/"/>
-    <ds:schemaRef ds:uri="http://purl.org/dc/terms/"/>
-    <ds:schemaRef ds:uri="http://schemas.microsoft.com/internal/obd"/>
+    <ds:schemaRef ds:uri="http://schemas.microsoft.com/sharepoint/v3/contenttype/forms"/>
   </ds:schemaRefs>
 </ds:datastoreItem>
 </file>
</xml_diff>

<commit_message>
Improve table creation logic and enhance sparse content handling
- Update table detection to require at least 3 comparative items and 60%+ pattern match, preventing unnecessary tables for simple lists.
- Skip table creation for Title and Agenda slides.
- Expand sparse content into detailed slides, enforcing a minimum of 12 slides per presentation.
- Update README to document enhanced table logic and sparse content handling.
</commit_message>
<xml_diff>
--- a/azure_function_ppt/templates/default_template.pptx
+++ b/azure_function_ppt/templates/default_template.pptx
@@ -7,20 +7,26 @@
     <p:sldMasterId id="2147483704" r:id="rId6"/>
   </p:sldMasterIdLst>
   <p:notesMasterIdLst>
-    <p:notesMasterId r:id="rId7"/>
+    <p:notesMasterId r:id="rId11"/>
   </p:notesMasterIdLst>
   <p:handoutMasterIdLst>
-    <p:handoutMasterId r:id="rId8"/>
+    <p:handoutMasterId r:id="rId12"/>
   </p:handoutMasterIdLst>
+  <p:sldIdLst>
+    <p:sldId id="256" r:id="rId7"/>
+    <p:sldId id="257" r:id="rId8"/>
+    <p:sldId id="258" r:id="rId9"/>
+    <p:sldId id="259" r:id="rId10"/>
+  </p:sldIdLst>
   <p:sldSz cx="12192000" cy="6858000"/>
   <p:notesSz cx="6858000" cy="9144000"/>
   <p:embeddedFontLst>
     <p:embeddedFont>
       <p:font typeface="Ubuntu" panose="020B0504030602030204" pitchFamily="34" charset="0"/>
-      <p:regular r:id="rId9"/>
-      <p:bold r:id="rId10"/>
-      <p:italic r:id="rId11"/>
-      <p:boldItalic r:id="rId12"/>
+      <p:regular r:id="rId13"/>
+      <p:bold r:id="rId14"/>
+      <p:italic r:id="rId15"/>
+      <p:boldItalic r:id="rId16"/>
     </p:embeddedFont>
   </p:embeddedFontLst>
   <p:defaultTextStyle>
@@ -368,7 +374,7 @@
           <a:p>
             <a:fld id="{FACC3EAE-22DF-2B4B-A1EA-17751061A738}" type="datetimeFigureOut">
               <a:rPr lang="en-US" smtClean="0"/>
-              <a:t>7/24/2025</a:t>
+              <a:t>7/25/2025</a:t>
             </a:fld>
             <a:endParaRPr lang="en-US"/>
           </a:p>
@@ -852,10 +858,10 @@
       </p:sp>
       <p:sp>
         <p:nvSpPr>
-          <p:cNvPr id="10" name="Text Placeholder 9">
+          <p:cNvPr id="5" name="Text Placeholder 4">
             <a:extLst>
               <a:ext uri="{FF2B5EF4-FFF2-40B4-BE49-F238E27FC236}">
-                <a16:creationId xmlns:a16="http://schemas.microsoft.com/office/drawing/2014/main" id="{17BC63FD-C70E-50B6-CE7D-3013EDF7CAE3}"/>
+                <a16:creationId xmlns:a16="http://schemas.microsoft.com/office/drawing/2014/main" id="{9800D5C8-3BD3-8824-2EB7-F6703A7F1E94}"/>
               </a:ext>
             </a:extLst>
           </p:cNvPr>
@@ -868,8 +874,8 @@
         </p:nvSpPr>
         <p:spPr>
           <a:xfrm>
-            <a:off x="1641475" y="4572000"/>
-            <a:ext cx="4718050" cy="1101725"/>
+            <a:off x="838200" y="4130391"/>
+            <a:ext cx="7880350" cy="1700212"/>
           </a:xfrm>
           <a:prstGeom prst="rect">
             <a:avLst/>
@@ -877,15 +883,20 @@
         </p:spPr>
         <p:txBody>
           <a:bodyPr/>
-          <a:lstStyle>
-            <a:lvl1pPr marL="0" indent="0">
-              <a:buNone/>
-              <a:defRPr/>
-            </a:lvl1pPr>
-          </a:lstStyle>
+          <a:lstStyle/>
           <a:p>
             <a:pPr lvl="0"/>
-            <a:endParaRPr lang="en-US" dirty="0"/>
+            <a:r>
+              <a:rPr lang="en-US" dirty="0"/>
+              <a:t>Click to edit Master text styles</a:t>
+            </a:r>
+          </a:p>
+          <a:p>
+            <a:pPr lvl="1"/>
+            <a:r>
+              <a:rPr lang="en-US" dirty="0"/>
+              <a:t>Second level</a:t>
+            </a:r>
           </a:p>
         </p:txBody>
       </p:sp>
@@ -1196,6 +1207,331 @@
 </file>
 
 <file path=ppt/slideLayouts/slideLayout3.xml><?xml version="1.0" encoding="utf-8"?>
+<p:sldLayout xmlns:a="http://schemas.openxmlformats.org/drawingml/2006/main" xmlns:r="http://schemas.openxmlformats.org/officeDocument/2006/relationships" xmlns:p="http://schemas.openxmlformats.org/presentationml/2006/main" preserve="1" userDrawn="1">
+  <p:cSld name="1_divider_2">
+    <p:bg>
+      <p:bgPr>
+        <a:gradFill flip="none" rotWithShape="1">
+          <a:gsLst>
+            <a:gs pos="0">
+              <a:schemeClr val="accent6"/>
+            </a:gs>
+            <a:gs pos="63000">
+              <a:schemeClr val="accent4"/>
+            </a:gs>
+          </a:gsLst>
+          <a:path path="circle">
+            <a:fillToRect t="100000" r="100000"/>
+          </a:path>
+          <a:tileRect l="-100000" b="-100000"/>
+        </a:gradFill>
+        <a:effectLst/>
+      </p:bgPr>
+    </p:bg>
+    <p:spTree>
+      <p:nvGrpSpPr>
+        <p:cNvPr id="1" name=""/>
+        <p:cNvGrpSpPr/>
+        <p:nvPr/>
+      </p:nvGrpSpPr>
+      <p:grpSpPr>
+        <a:xfrm>
+          <a:off x="0" y="0"/>
+          <a:ext cx="0" cy="0"/>
+          <a:chOff x="0" y="0"/>
+          <a:chExt cx="0" cy="0"/>
+        </a:xfrm>
+      </p:grpSpPr>
+      <p:sp>
+        <p:nvSpPr>
+          <p:cNvPr id="3" name="Google Shape;64;p14">
+            <a:extLst>
+              <a:ext uri="{FF2B5EF4-FFF2-40B4-BE49-F238E27FC236}">
+                <a16:creationId xmlns:a16="http://schemas.microsoft.com/office/drawing/2014/main" id="{42EE438F-E41F-8896-B745-1D9DE0B48365}"/>
+              </a:ext>
+            </a:extLst>
+          </p:cNvPr>
+          <p:cNvSpPr txBox="1"/>
+          <p:nvPr userDrawn="1"/>
+        </p:nvSpPr>
+        <p:spPr>
+          <a:xfrm>
+            <a:off x="3228854" y="6477271"/>
+            <a:ext cx="5734293" cy="393600"/>
+          </a:xfrm>
+          <a:prstGeom prst="rect">
+            <a:avLst/>
+          </a:prstGeom>
+          <a:noFill/>
+          <a:ln>
+            <a:noFill/>
+          </a:ln>
+        </p:spPr>
+        <p:txBody>
+          <a:bodyPr spcFirstLastPara="1" wrap="square" lIns="91425" tIns="91425" rIns="91425" bIns="91425" anchor="ctr" anchorCtr="0">
+            <a:noAutofit/>
+          </a:bodyPr>
+          <a:lstStyle/>
+          <a:p>
+            <a:pPr algn="ctr"/>
+            <a:r>
+              <a:rPr lang="en-US" sz="500" b="0" i="0" u="none" strike="noStrike" kern="1200" dirty="0">
+                <a:solidFill>
+                  <a:schemeClr val="bg1">
+                    <a:alpha val="50000"/>
+                  </a:schemeClr>
+                </a:solidFill>
+                <a:effectLst/>
+                <a:latin typeface="Ubuntu" panose="020B0504030602030204" pitchFamily="34" charset="0"/>
+                <a:ea typeface="+mn-ea"/>
+                <a:cs typeface="+mn-cs"/>
+              </a:rPr>
+              <a:t>© NCS Pte Ltd. All Rights Reserved. The content of this presentation is proprietary and confidential information of NCS. It is not intended to be distributed without the written consent of NCS.</a:t>
+            </a:r>
+          </a:p>
+        </p:txBody>
+      </p:sp>
+      <p:sp>
+        <p:nvSpPr>
+          <p:cNvPr id="7" name="TextBox 6">
+            <a:extLst>
+              <a:ext uri="{FF2B5EF4-FFF2-40B4-BE49-F238E27FC236}">
+                <a16:creationId xmlns:a16="http://schemas.microsoft.com/office/drawing/2014/main" id="{B2753EEC-AD20-EC84-4274-9F57299D663A}"/>
+              </a:ext>
+            </a:extLst>
+          </p:cNvPr>
+          <p:cNvSpPr txBox="1"/>
+          <p:nvPr userDrawn="1"/>
+        </p:nvSpPr>
+        <p:spPr>
+          <a:xfrm>
+            <a:off x="9856527" y="6575857"/>
+            <a:ext cx="1819218" cy="184666"/>
+          </a:xfrm>
+          <a:prstGeom prst="rect">
+            <a:avLst/>
+          </a:prstGeom>
+          <a:noFill/>
+          <a:ln>
+            <a:noFill/>
+          </a:ln>
+        </p:spPr>
+        <p:txBody>
+          <a:bodyPr wrap="square" rtlCol="0">
+            <a:spAutoFit/>
+          </a:bodyPr>
+          <a:lstStyle/>
+          <a:p>
+            <a:pPr algn="r"/>
+            <a:fld id="{8887BFF0-B513-2F4E-8ECC-A2B4BAC9622A}" type="slidenum">
+              <a:rPr lang="en-US" sz="600" smtClean="0">
+                <a:solidFill>
+                  <a:schemeClr val="bg1"/>
+                </a:solidFill>
+                <a:latin typeface="Ubuntu" panose="020B0504030602030204" pitchFamily="34" charset="0"/>
+              </a:rPr>
+              <a:pPr algn="r"/>
+              <a:t>‹#›</a:t>
+            </a:fld>
+            <a:endParaRPr lang="en-US" sz="600" dirty="0">
+              <a:solidFill>
+                <a:schemeClr val="bg1"/>
+              </a:solidFill>
+              <a:latin typeface="Ubuntu" panose="020B0504030602030204" pitchFamily="34" charset="0"/>
+            </a:endParaRPr>
+          </a:p>
+        </p:txBody>
+      </p:sp>
+      <p:cxnSp>
+        <p:nvCxnSpPr>
+          <p:cNvPr id="8" name="Straight Connector 7">
+            <a:extLst>
+              <a:ext uri="{FF2B5EF4-FFF2-40B4-BE49-F238E27FC236}">
+                <a16:creationId xmlns:a16="http://schemas.microsoft.com/office/drawing/2014/main" id="{6637A7A5-70C1-473B-2A4D-2E7F8691FC72}"/>
+              </a:ext>
+            </a:extLst>
+          </p:cNvPr>
+          <p:cNvCxnSpPr/>
+          <p:nvPr userDrawn="1"/>
+        </p:nvCxnSpPr>
+        <p:spPr>
+          <a:xfrm>
+            <a:off x="591399" y="6502400"/>
+            <a:ext cx="11013226" cy="0"/>
+          </a:xfrm>
+          <a:prstGeom prst="line">
+            <a:avLst/>
+          </a:prstGeom>
+          <a:ln>
+            <a:solidFill>
+              <a:schemeClr val="bg1"/>
+            </a:solidFill>
+          </a:ln>
+        </p:spPr>
+        <p:style>
+          <a:lnRef idx="1">
+            <a:schemeClr val="accent1"/>
+          </a:lnRef>
+          <a:fillRef idx="0">
+            <a:schemeClr val="accent1"/>
+          </a:fillRef>
+          <a:effectRef idx="0">
+            <a:schemeClr val="accent1"/>
+          </a:effectRef>
+          <a:fontRef idx="minor">
+            <a:schemeClr val="tx1"/>
+          </a:fontRef>
+        </p:style>
+      </p:cxnSp>
+      <p:pic>
+        <p:nvPicPr>
+          <p:cNvPr id="9" name="Picture 8">
+            <a:extLst>
+              <a:ext uri="{FF2B5EF4-FFF2-40B4-BE49-F238E27FC236}">
+                <a16:creationId xmlns:a16="http://schemas.microsoft.com/office/drawing/2014/main" id="{B61AFA0B-94C7-66B8-D004-55598A6F3C48}"/>
+              </a:ext>
+            </a:extLst>
+          </p:cNvPr>
+          <p:cNvPicPr>
+            <a:picLocks noChangeAspect="1"/>
+          </p:cNvPicPr>
+          <p:nvPr userDrawn="1"/>
+        </p:nvPicPr>
+        <p:blipFill>
+          <a:blip r:embed="rId2">
+            <a:lum bright="100000"/>
+          </a:blip>
+          <a:stretch>
+            <a:fillRect/>
+          </a:stretch>
+        </p:blipFill>
+        <p:spPr>
+          <a:xfrm>
+            <a:off x="594676" y="6622590"/>
+            <a:ext cx="545150" cy="125804"/>
+          </a:xfrm>
+          <a:prstGeom prst="rect">
+            <a:avLst/>
+          </a:prstGeom>
+        </p:spPr>
+      </p:pic>
+      <p:sp>
+        <p:nvSpPr>
+          <p:cNvPr id="5" name="Title 4">
+            <a:extLst>
+              <a:ext uri="{FF2B5EF4-FFF2-40B4-BE49-F238E27FC236}">
+                <a16:creationId xmlns:a16="http://schemas.microsoft.com/office/drawing/2014/main" id="{662A9060-2423-A5CD-D071-EDB8C21A2DDD}"/>
+              </a:ext>
+            </a:extLst>
+          </p:cNvPr>
+          <p:cNvSpPr>
+            <a:spLocks noGrp="1"/>
+          </p:cNvSpPr>
+          <p:nvPr>
+            <p:ph type="title"/>
+          </p:nvPr>
+        </p:nvSpPr>
+        <p:spPr>
+          <a:xfrm>
+            <a:off x="838200" y="479959"/>
+            <a:ext cx="10515600" cy="1016866"/>
+          </a:xfrm>
+          <a:prstGeom prst="rect">
+            <a:avLst/>
+          </a:prstGeom>
+        </p:spPr>
+        <p:txBody>
+          <a:bodyPr/>
+          <a:lstStyle>
+            <a:lvl1pPr algn="ctr">
+              <a:defRPr/>
+            </a:lvl1pPr>
+          </a:lstStyle>
+          <a:p>
+            <a:endParaRPr lang="en-US" dirty="0"/>
+          </a:p>
+        </p:txBody>
+      </p:sp>
+      <p:sp>
+        <p:nvSpPr>
+          <p:cNvPr id="4" name="Text Placeholder 3">
+            <a:extLst>
+              <a:ext uri="{FF2B5EF4-FFF2-40B4-BE49-F238E27FC236}">
+                <a16:creationId xmlns:a16="http://schemas.microsoft.com/office/drawing/2014/main" id="{F62B609F-11EF-5B60-53CC-35C752918248}"/>
+              </a:ext>
+            </a:extLst>
+          </p:cNvPr>
+          <p:cNvSpPr>
+            <a:spLocks noGrp="1"/>
+          </p:cNvSpPr>
+          <p:nvPr>
+            <p:ph type="body" sz="quarter" idx="10"/>
+          </p:nvPr>
+        </p:nvSpPr>
+        <p:spPr>
+          <a:xfrm>
+            <a:off x="838200" y="1955800"/>
+            <a:ext cx="10515600" cy="4422775"/>
+          </a:xfrm>
+          <a:prstGeom prst="rect">
+            <a:avLst/>
+          </a:prstGeom>
+        </p:spPr>
+        <p:txBody>
+          <a:bodyPr/>
+          <a:lstStyle/>
+          <a:p>
+            <a:pPr lvl="0"/>
+            <a:r>
+              <a:rPr lang="en-US" dirty="0"/>
+              <a:t>Click to edit Master text styles</a:t>
+            </a:r>
+          </a:p>
+          <a:p>
+            <a:pPr lvl="1"/>
+            <a:r>
+              <a:rPr lang="en-US" dirty="0"/>
+              <a:t>Second level</a:t>
+            </a:r>
+          </a:p>
+          <a:p>
+            <a:pPr lvl="2"/>
+            <a:r>
+              <a:rPr lang="en-US" dirty="0"/>
+              <a:t>Third level</a:t>
+            </a:r>
+          </a:p>
+          <a:p>
+            <a:pPr lvl="3"/>
+            <a:r>
+              <a:rPr lang="en-US" dirty="0"/>
+              <a:t>Fourth level</a:t>
+            </a:r>
+          </a:p>
+          <a:p>
+            <a:pPr lvl="4"/>
+            <a:r>
+              <a:rPr lang="en-US" dirty="0"/>
+              <a:t>Fifth level</a:t>
+            </a:r>
+            <a:endParaRPr lang="en-SG" dirty="0"/>
+          </a:p>
+        </p:txBody>
+      </p:sp>
+    </p:spTree>
+    <p:extLst>
+      <p:ext uri="{BB962C8B-B14F-4D97-AF65-F5344CB8AC3E}">
+        <p14:creationId xmlns:p14="http://schemas.microsoft.com/office/powerpoint/2010/main" val="1096083064"/>
+      </p:ext>
+    </p:extLst>
+  </p:cSld>
+  <p:clrMapOvr>
+    <a:masterClrMapping/>
+  </p:clrMapOvr>
+</p:sldLayout>
+</file>
+
+<file path=ppt/slideLayouts/slideLayout4.xml><?xml version="1.0" encoding="utf-8"?>
 <p:sldLayout xmlns:a="http://schemas.openxmlformats.org/drawingml/2006/main" xmlns:r="http://schemas.openxmlformats.org/officeDocument/2006/relationships" xmlns:p="http://schemas.openxmlformats.org/presentationml/2006/main" preserve="1" userDrawn="1">
   <p:cSld name="1_divider_1">
     <p:bg>
@@ -1403,7 +1739,12 @@
         </p:spPr>
         <p:txBody>
           <a:bodyPr/>
-          <a:lstStyle/>
+          <a:lstStyle>
+            <a:lvl1pPr marL="0" indent="0">
+              <a:buNone/>
+              <a:defRPr/>
+            </a:lvl1pPr>
+          </a:lstStyle>
           <a:p>
             <a:pPr lvl="0"/>
             <a:endParaRPr lang="en-US" dirty="0"/>
@@ -1798,6 +2139,7 @@
   <p:clrMap bg1="lt1" tx1="dk1" bg2="lt2" tx2="dk2" accent1="accent1" accent2="accent2" accent3="accent3" accent4="accent4" accent5="accent5" accent6="accent6" hlink="hlink" folHlink="folHlink"/>
   <p:sldLayoutIdLst>
     <p:sldLayoutId id="2147483652" r:id="rId1"/>
+    <p:sldLayoutId id="2147483653" r:id="rId2"/>
   </p:sldLayoutIdLst>
   <p:hf hdr="0" ftr="0" dt="0"/>
   <p:txStyles>
@@ -2485,6 +2827,301 @@
     </p:otherStyle>
   </p:txStyles>
 </p:sldMaster>
+</file>
+
+<file path=ppt/slides/slide1.xml><?xml version="1.0" encoding="utf-8"?>
+<p:sld xmlns:a="http://schemas.openxmlformats.org/drawingml/2006/main" xmlns:r="http://schemas.openxmlformats.org/officeDocument/2006/relationships" xmlns:p="http://schemas.openxmlformats.org/presentationml/2006/main">
+  <p:cSld>
+    <p:spTree>
+      <p:nvGrpSpPr>
+        <p:cNvPr id="1" name=""/>
+        <p:cNvGrpSpPr/>
+        <p:nvPr/>
+      </p:nvGrpSpPr>
+      <p:grpSpPr>
+        <a:xfrm>
+          <a:off x="0" y="0"/>
+          <a:ext cx="0" cy="0"/>
+          <a:chOff x="0" y="0"/>
+          <a:chExt cx="0" cy="0"/>
+        </a:xfrm>
+      </p:grpSpPr>
+      <p:sp>
+        <p:nvSpPr>
+          <p:cNvPr id="2" name="Title 1">
+            <a:extLst>
+              <a:ext uri="{FF2B5EF4-FFF2-40B4-BE49-F238E27FC236}">
+                <a16:creationId xmlns:a16="http://schemas.microsoft.com/office/drawing/2014/main" id="{F7C5A979-1F53-8821-14E7-581F3E669432}"/>
+              </a:ext>
+            </a:extLst>
+          </p:cNvPr>
+          <p:cNvSpPr>
+            <a:spLocks noGrp="1"/>
+          </p:cNvSpPr>
+          <p:nvPr>
+            <p:ph type="title"/>
+          </p:nvPr>
+        </p:nvSpPr>
+        <p:spPr/>
+        <p:txBody>
+          <a:bodyPr/>
+          <a:lstStyle/>
+          <a:p>
+            <a:endParaRPr lang="en-SG"/>
+          </a:p>
+        </p:txBody>
+      </p:sp>
+      <p:sp>
+        <p:nvSpPr>
+          <p:cNvPr id="3" name="Text Placeholder 2">
+            <a:extLst>
+              <a:ext uri="{FF2B5EF4-FFF2-40B4-BE49-F238E27FC236}">
+                <a16:creationId xmlns:a16="http://schemas.microsoft.com/office/drawing/2014/main" id="{BFE54822-6F18-6EFA-0CDC-98AFE19C2142}"/>
+              </a:ext>
+            </a:extLst>
+          </p:cNvPr>
+          <p:cNvSpPr>
+            <a:spLocks noGrp="1"/>
+          </p:cNvSpPr>
+          <p:nvPr>
+            <p:ph type="body" sz="quarter" idx="10"/>
+          </p:nvPr>
+        </p:nvSpPr>
+        <p:spPr/>
+        <p:txBody>
+          <a:bodyPr/>
+          <a:lstStyle/>
+          <a:p>
+            <a:endParaRPr lang="en-SG"/>
+          </a:p>
+        </p:txBody>
+      </p:sp>
+    </p:spTree>
+    <p:extLst>
+      <p:ext uri="{BB962C8B-B14F-4D97-AF65-F5344CB8AC3E}">
+        <p14:creationId xmlns:p14="http://schemas.microsoft.com/office/powerpoint/2010/main" val="1585436814"/>
+      </p:ext>
+    </p:extLst>
+  </p:cSld>
+  <p:clrMapOvr>
+    <a:masterClrMapping/>
+  </p:clrMapOvr>
+</p:sld>
+</file>
+
+<file path=ppt/slides/slide2.xml><?xml version="1.0" encoding="utf-8"?>
+<p:sld xmlns:a="http://schemas.openxmlformats.org/drawingml/2006/main" xmlns:r="http://schemas.openxmlformats.org/officeDocument/2006/relationships" xmlns:p="http://schemas.openxmlformats.org/presentationml/2006/main">
+  <p:cSld>
+    <p:spTree>
+      <p:nvGrpSpPr>
+        <p:cNvPr id="1" name=""/>
+        <p:cNvGrpSpPr/>
+        <p:nvPr/>
+      </p:nvGrpSpPr>
+      <p:grpSpPr>
+        <a:xfrm>
+          <a:off x="0" y="0"/>
+          <a:ext cx="0" cy="0"/>
+          <a:chOff x="0" y="0"/>
+          <a:chExt cx="0" cy="0"/>
+        </a:xfrm>
+      </p:grpSpPr>
+      <p:sp>
+        <p:nvSpPr>
+          <p:cNvPr id="2" name="Title 1">
+            <a:extLst>
+              <a:ext uri="{FF2B5EF4-FFF2-40B4-BE49-F238E27FC236}">
+                <a16:creationId xmlns:a16="http://schemas.microsoft.com/office/drawing/2014/main" id="{47E5F70D-2144-D508-1050-13101480937E}"/>
+              </a:ext>
+            </a:extLst>
+          </p:cNvPr>
+          <p:cNvSpPr>
+            <a:spLocks noGrp="1"/>
+          </p:cNvSpPr>
+          <p:nvPr>
+            <p:ph type="title"/>
+          </p:nvPr>
+        </p:nvSpPr>
+        <p:spPr/>
+        <p:txBody>
+          <a:bodyPr/>
+          <a:lstStyle/>
+          <a:p>
+            <a:endParaRPr lang="en-SG"/>
+          </a:p>
+        </p:txBody>
+      </p:sp>
+      <p:sp>
+        <p:nvSpPr>
+          <p:cNvPr id="3" name="Content Placeholder 2">
+            <a:extLst>
+              <a:ext uri="{FF2B5EF4-FFF2-40B4-BE49-F238E27FC236}">
+                <a16:creationId xmlns:a16="http://schemas.microsoft.com/office/drawing/2014/main" id="{091355AC-2178-B145-FB19-EE0BB57EF5C1}"/>
+              </a:ext>
+            </a:extLst>
+          </p:cNvPr>
+          <p:cNvSpPr>
+            <a:spLocks noGrp="1"/>
+          </p:cNvSpPr>
+          <p:nvPr>
+            <p:ph sz="quarter" idx="10"/>
+          </p:nvPr>
+        </p:nvSpPr>
+        <p:spPr/>
+        <p:txBody>
+          <a:bodyPr/>
+          <a:lstStyle/>
+          <a:p>
+            <a:endParaRPr lang="en-SG"/>
+          </a:p>
+        </p:txBody>
+      </p:sp>
+    </p:spTree>
+    <p:extLst>
+      <p:ext uri="{BB962C8B-B14F-4D97-AF65-F5344CB8AC3E}">
+        <p14:creationId xmlns:p14="http://schemas.microsoft.com/office/powerpoint/2010/main" val="880551495"/>
+      </p:ext>
+    </p:extLst>
+  </p:cSld>
+  <p:clrMapOvr>
+    <a:masterClrMapping/>
+  </p:clrMapOvr>
+</p:sld>
+</file>
+
+<file path=ppt/slides/slide3.xml><?xml version="1.0" encoding="utf-8"?>
+<p:sld xmlns:a="http://schemas.openxmlformats.org/drawingml/2006/main" xmlns:r="http://schemas.openxmlformats.org/officeDocument/2006/relationships" xmlns:p="http://schemas.openxmlformats.org/presentationml/2006/main">
+  <p:cSld>
+    <p:spTree>
+      <p:nvGrpSpPr>
+        <p:cNvPr id="1" name=""/>
+        <p:cNvGrpSpPr/>
+        <p:nvPr/>
+      </p:nvGrpSpPr>
+      <p:grpSpPr>
+        <a:xfrm>
+          <a:off x="0" y="0"/>
+          <a:ext cx="0" cy="0"/>
+          <a:chOff x="0" y="0"/>
+          <a:chExt cx="0" cy="0"/>
+        </a:xfrm>
+      </p:grpSpPr>
+      <p:sp>
+        <p:nvSpPr>
+          <p:cNvPr id="2" name="Title 1">
+            <a:extLst>
+              <a:ext uri="{FF2B5EF4-FFF2-40B4-BE49-F238E27FC236}">
+                <a16:creationId xmlns:a16="http://schemas.microsoft.com/office/drawing/2014/main" id="{0EB5E649-221C-D500-824E-02610E16CAF6}"/>
+              </a:ext>
+            </a:extLst>
+          </p:cNvPr>
+          <p:cNvSpPr>
+            <a:spLocks noGrp="1"/>
+          </p:cNvSpPr>
+          <p:nvPr>
+            <p:ph type="title"/>
+          </p:nvPr>
+        </p:nvSpPr>
+        <p:spPr/>
+        <p:txBody>
+          <a:bodyPr/>
+          <a:lstStyle/>
+          <a:p>
+            <a:endParaRPr lang="en-SG"/>
+          </a:p>
+        </p:txBody>
+      </p:sp>
+      <p:sp>
+        <p:nvSpPr>
+          <p:cNvPr id="3" name="Text Placeholder 2">
+            <a:extLst>
+              <a:ext uri="{FF2B5EF4-FFF2-40B4-BE49-F238E27FC236}">
+                <a16:creationId xmlns:a16="http://schemas.microsoft.com/office/drawing/2014/main" id="{21A59862-1B0E-EE49-8B3B-9120676574DD}"/>
+              </a:ext>
+            </a:extLst>
+          </p:cNvPr>
+          <p:cNvSpPr>
+            <a:spLocks noGrp="1"/>
+          </p:cNvSpPr>
+          <p:nvPr>
+            <p:ph type="body" sz="quarter" idx="10"/>
+          </p:nvPr>
+        </p:nvSpPr>
+        <p:spPr/>
+        <p:txBody>
+          <a:bodyPr/>
+          <a:lstStyle/>
+          <a:p>
+            <a:endParaRPr lang="en-SG"/>
+          </a:p>
+        </p:txBody>
+      </p:sp>
+    </p:spTree>
+    <p:extLst>
+      <p:ext uri="{BB962C8B-B14F-4D97-AF65-F5344CB8AC3E}">
+        <p14:creationId xmlns:p14="http://schemas.microsoft.com/office/powerpoint/2010/main" val="2030374816"/>
+      </p:ext>
+    </p:extLst>
+  </p:cSld>
+  <p:clrMapOvr>
+    <a:masterClrMapping/>
+  </p:clrMapOvr>
+</p:sld>
+</file>
+
+<file path=ppt/slides/slide4.xml><?xml version="1.0" encoding="utf-8"?>
+<p:sld xmlns:a="http://schemas.openxmlformats.org/drawingml/2006/main" xmlns:r="http://schemas.openxmlformats.org/officeDocument/2006/relationships" xmlns:p="http://schemas.openxmlformats.org/presentationml/2006/main">
+  <p:cSld>
+    <p:spTree>
+      <p:nvGrpSpPr>
+        <p:cNvPr id="1" name=""/>
+        <p:cNvGrpSpPr/>
+        <p:nvPr/>
+      </p:nvGrpSpPr>
+      <p:grpSpPr>
+        <a:xfrm>
+          <a:off x="0" y="0"/>
+          <a:ext cx="0" cy="0"/>
+          <a:chOff x="0" y="0"/>
+          <a:chExt cx="0" cy="0"/>
+        </a:xfrm>
+      </p:grpSpPr>
+      <p:sp>
+        <p:nvSpPr>
+          <p:cNvPr id="2" name="Text Placeholder 1">
+            <a:extLst>
+              <a:ext uri="{FF2B5EF4-FFF2-40B4-BE49-F238E27FC236}">
+                <a16:creationId xmlns:a16="http://schemas.microsoft.com/office/drawing/2014/main" id="{7510908F-04A7-97CE-EFCE-DF8BEBF97EE1}"/>
+              </a:ext>
+            </a:extLst>
+          </p:cNvPr>
+          <p:cNvSpPr>
+            <a:spLocks noGrp="1"/>
+          </p:cNvSpPr>
+          <p:nvPr>
+            <p:ph type="body" sz="quarter" idx="10"/>
+          </p:nvPr>
+        </p:nvSpPr>
+        <p:spPr/>
+        <p:txBody>
+          <a:bodyPr/>
+          <a:lstStyle/>
+          <a:p>
+            <a:endParaRPr lang="en-SG"/>
+          </a:p>
+        </p:txBody>
+      </p:sp>
+    </p:spTree>
+    <p:extLst>
+      <p:ext uri="{BB962C8B-B14F-4D97-AF65-F5344CB8AC3E}">
+        <p14:creationId xmlns:p14="http://schemas.microsoft.com/office/powerpoint/2010/main" val="470111434"/>
+      </p:ext>
+    </p:extLst>
+  </p:cSld>
+  <p:clrMapOvr>
+    <a:masterClrMapping/>
+  </p:clrMapOvr>
+</p:sld>
 </file>
 
 <file path=ppt/theme/theme1.xml><?xml version="1.0" encoding="utf-8"?>

</xml_diff>